<commit_message>
Actualizadas notas de la traspa
</commit_message>
<xml_diff>
--- a/TICsLei.NET.pptx
+++ b/TICsLei.NET.pptx
@@ -702,9 +702,80 @@
               <a:defRPr/>
             </a:pPr>
             <a:r>
-              <a:rPr lang="es-ES" sz="1600" dirty="0"/>
-              <a:t>Como mínimo un evento al mes</a:t>
+              <a:rPr lang="es-ES" dirty="0"/>
+              <a:t>Bienvenida. Disculpas por la hora.</a:t>
             </a:r>
+          </a:p>
+          <a:p>
+            <a:pPr marL="285750" marR="0" indent="-285750" algn="l" defTabSz="914400" rtl="0" eaLnBrk="1" fontAlgn="auto" latinLnBrk="0" hangingPunct="1">
+              <a:lnSpc>
+                <a:spcPct val="100000"/>
+              </a:lnSpc>
+              <a:spcBef>
+                <a:spcPts val="0"/>
+              </a:spcBef>
+              <a:spcAft>
+                <a:spcPts val="0"/>
+              </a:spcAft>
+              <a:buClrTx/>
+              <a:buSzTx/>
+              <a:buFont typeface="Arial" panose="020B0604020202020204" pitchFamily="34" charset="0"/>
+              <a:buChar char="•"/>
+              <a:tabLst/>
+              <a:defRPr/>
+            </a:pPr>
+            <a:r>
+              <a:rPr lang="es-ES" dirty="0"/>
+              <a:t>Recordatorio de qué es Santiago.NET</a:t>
+            </a:r>
+          </a:p>
+          <a:p>
+            <a:pPr marL="285750" marR="0" indent="-285750" algn="l" defTabSz="914400" rtl="0" eaLnBrk="1" fontAlgn="auto" latinLnBrk="0" hangingPunct="1">
+              <a:lnSpc>
+                <a:spcPct val="100000"/>
+              </a:lnSpc>
+              <a:spcBef>
+                <a:spcPts val="0"/>
+              </a:spcBef>
+              <a:spcAft>
+                <a:spcPts val="0"/>
+              </a:spcAft>
+              <a:buClrTx/>
+              <a:buSzTx/>
+              <a:buFont typeface="Arial" panose="020B0604020202020204" pitchFamily="34" charset="0"/>
+              <a:buChar char="•"/>
+              <a:tabLst/>
+              <a:defRPr/>
+            </a:pPr>
+            <a:r>
+              <a:rPr lang="es-ES" dirty="0"/>
+              <a:t>Presentar a </a:t>
+            </a:r>
+            <a:r>
+              <a:rPr lang="es-ES" dirty="0" err="1"/>
+              <a:t>noloegaltech</a:t>
+            </a:r>
+            <a:r>
+              <a:rPr lang="es-ES" dirty="0"/>
+              <a:t>. </a:t>
+            </a:r>
+            <a:r>
+              <a:rPr lang="es-ES" dirty="0" err="1"/>
+              <a:t>Code</a:t>
+            </a:r>
+            <a:r>
+              <a:rPr lang="es-ES" dirty="0"/>
+              <a:t> </a:t>
+            </a:r>
+            <a:r>
+              <a:rPr lang="es-ES" dirty="0" err="1"/>
+              <a:t>Law</a:t>
+            </a:r>
+            <a:r>
+              <a:rPr lang="es-ES"/>
+              <a:t>.</a:t>
+            </a:r>
+            <a:endParaRPr lang="es-ES" dirty="0"/>
           </a:p>
           <a:p>
             <a:pPr marL="742950" marR="0" lvl="1" indent="-285750" algn="l" defTabSz="914400" rtl="0" eaLnBrk="1" fontAlgn="auto" latinLnBrk="0" hangingPunct="1">
@@ -719,123 +790,74 @@
               </a:spcAft>
               <a:buClrTx/>
               <a:buSzTx/>
-              <a:buFont typeface="Wingdings" panose="05000000000000000000" pitchFamily="2" charset="2"/>
-              <a:buChar char="Ø"/>
+              <a:buFont typeface="Arial" panose="020B0604020202020204" pitchFamily="34" charset="0"/>
+              <a:buChar char="•"/>
               <a:tabLst/>
               <a:defRPr/>
             </a:pPr>
             <a:r>
-              <a:rPr lang="es-ES" sz="1600" dirty="0"/>
-              <a:t>Propuesto desde Microsoft (retos mensuales)</a:t>
+              <a:rPr lang="en-US" sz="1200" b="1" kern="1200" dirty="0">
+                <a:solidFill>
+                  <a:schemeClr val="tx1"/>
+                </a:solidFill>
+                <a:effectLst/>
+                <a:latin typeface="+mn-lt"/>
+                <a:ea typeface="+mn-ea"/>
+                <a:cs typeface="+mn-cs"/>
+                <a:hlinkClick r:id="rId3"/>
+              </a:rPr>
+              <a:t>BÁRBARA ROMÁN</a:t>
             </a:r>
-          </a:p>
-          <a:p>
-            <a:pPr marL="742950" lvl="1" indent="-285750">
-              <a:buFont typeface="Wingdings" panose="05000000000000000000" pitchFamily="2" charset="2"/>
-              <a:buChar char="Ø"/>
+            <a:endParaRPr lang="en-US" sz="1200" b="1" kern="1200" dirty="0">
+              <a:solidFill>
+                <a:schemeClr val="tx1"/>
+              </a:solidFill>
+              <a:effectLst/>
+              <a:latin typeface="+mn-lt"/>
+              <a:ea typeface="+mn-ea"/>
+              <a:cs typeface="+mn-cs"/>
+            </a:endParaRPr>
+          </a:p>
+          <a:p>
+            <a:pPr marL="742950" marR="0" lvl="1" indent="-285750" algn="l" defTabSz="914400" rtl="0" eaLnBrk="1" fontAlgn="auto" latinLnBrk="0" hangingPunct="1">
+              <a:lnSpc>
+                <a:spcPct val="100000"/>
+              </a:lnSpc>
+              <a:spcBef>
+                <a:spcPts val="0"/>
+              </a:spcBef>
+              <a:spcAft>
+                <a:spcPts val="0"/>
+              </a:spcAft>
+              <a:buClrTx/>
+              <a:buSzTx/>
+              <a:buFont typeface="Arial" panose="020B0604020202020204" pitchFamily="34" charset="0"/>
+              <a:buChar char="•"/>
+              <a:tabLst/>
+              <a:defRPr/>
             </a:pPr>
             <a:r>
-              <a:rPr lang="es-ES" sz="1600" dirty="0"/>
-              <a:t>Creado por nosotros (Charlas, sesiones, talleres, campeonatos, </a:t>
+              <a:rPr lang="en-US" sz="1200" b="1" kern="1200" dirty="0">
+                <a:solidFill>
+                  <a:schemeClr val="tx1"/>
+                </a:solidFill>
+                <a:effectLst/>
+                <a:latin typeface="+mn-lt"/>
+                <a:ea typeface="+mn-ea"/>
+                <a:cs typeface="+mn-cs"/>
+                <a:hlinkClick r:id="rId4"/>
+              </a:rPr>
+              <a:t>JOSÉ MANUEL SENDÍN</a:t>
             </a:r>
-            <a:r>
-              <a:rPr lang="es-ES" sz="1600" dirty="0" err="1"/>
-              <a:t>webcast</a:t>
-            </a:r>
-            <a:r>
-              <a:rPr lang="es-ES" sz="1600" dirty="0"/>
-              <a:t>,…)</a:t>
-            </a:r>
-          </a:p>
-          <a:p>
-            <a:pPr marL="285750" lvl="0" indent="-285750">
-              <a:buFont typeface="Arial" panose="020B0604020202020204" pitchFamily="34" charset="0"/>
-              <a:buChar char="•"/>
-            </a:pPr>
-            <a:r>
-              <a:rPr lang="es-ES" sz="1600" dirty="0"/>
-              <a:t>Aprendemos sobre</a:t>
-            </a:r>
-            <a:r>
-              <a:rPr lang="es-ES" sz="1600" baseline="0" dirty="0"/>
-              <a:t> las tecnologías que nos gustan y lo compartimos con el resto de miembros.</a:t>
-            </a:r>
-          </a:p>
-          <a:p>
-            <a:pPr marL="285750" lvl="0" indent="-285750">
-              <a:buFont typeface="Arial" panose="020B0604020202020204" pitchFamily="34" charset="0"/>
-              <a:buChar char="•"/>
-            </a:pPr>
-            <a:r>
-              <a:rPr lang="es-ES" sz="1600" baseline="0" dirty="0"/>
-              <a:t>Damos formación a los alumnos sobre la tecnología que aprendemos.</a:t>
-            </a:r>
-          </a:p>
-          <a:p>
-            <a:pPr marL="285750" lvl="0" indent="-285750">
-              <a:buFont typeface="Arial" panose="020B0604020202020204" pitchFamily="34" charset="0"/>
-              <a:buChar char="•"/>
-            </a:pPr>
-            <a:r>
-              <a:rPr lang="es-ES" sz="1600" baseline="0" dirty="0"/>
-              <a:t>Participamos en toda clase de actividades tecnológicas.</a:t>
-            </a:r>
-          </a:p>
-          <a:p>
-            <a:pPr marL="285750" lvl="0" indent="-285750">
-              <a:buFont typeface="Arial" panose="020B0604020202020204" pitchFamily="34" charset="0"/>
-              <a:buChar char="•"/>
-            </a:pPr>
-            <a:r>
-              <a:rPr lang="es-ES" sz="2800" dirty="0"/>
-              <a:t>Nos posicionamos</a:t>
-            </a:r>
-            <a:r>
-              <a:rPr lang="es-ES" sz="2800" baseline="0" dirty="0"/>
-              <a:t> como</a:t>
-            </a:r>
-            <a:r>
-              <a:rPr lang="es-ES" sz="2800" dirty="0"/>
-              <a:t> una referencia para los estudiantes de nuestra universidad</a:t>
-            </a:r>
-          </a:p>
-          <a:p>
-            <a:pPr marL="285750" lvl="0" indent="-285750">
-              <a:buFont typeface="Arial" panose="020B0604020202020204" pitchFamily="34" charset="0"/>
-              <a:buChar char="•"/>
-            </a:pPr>
-            <a:r>
-              <a:rPr lang="es-ES" sz="2800" dirty="0"/>
-              <a:t>Mantenemos una continuidad en el tiempo con nuevos miembros</a:t>
-            </a:r>
-          </a:p>
-          <a:p>
-            <a:pPr marL="285750" lvl="0" indent="-285750">
-              <a:buFont typeface="Arial" panose="020B0604020202020204" pitchFamily="34" charset="0"/>
-              <a:buChar char="•"/>
-            </a:pPr>
-            <a:r>
-              <a:rPr lang="es-ES" sz="2800" dirty="0"/>
-              <a:t>Desarrollamos proyectos propios</a:t>
-            </a:r>
-          </a:p>
-          <a:p>
-            <a:pPr marL="285750" lvl="0" indent="-285750">
-              <a:buFont typeface="Arial" panose="020B0604020202020204" pitchFamily="34" charset="0"/>
-              <a:buChar char="•"/>
-            </a:pPr>
-            <a:r>
-              <a:rPr lang="es-ES" sz="2800" dirty="0"/>
-              <a:t>Movemos eventos técnicos en la universidad que surgen</a:t>
-            </a:r>
-            <a:r>
-              <a:rPr lang="es-ES" sz="2800" baseline="0" dirty="0"/>
-              <a:t> de empresas del sector.</a:t>
-            </a:r>
-            <a:endParaRPr lang="es-ES" sz="2800" dirty="0"/>
-          </a:p>
-          <a:p>
-            <a:endParaRPr lang="es-ES" dirty="0"/>
+            <a:endParaRPr lang="en-US" sz="1200" b="1" kern="1200" dirty="0">
+              <a:solidFill>
+                <a:schemeClr val="tx1"/>
+              </a:solidFill>
+              <a:effectLst/>
+              <a:latin typeface="+mn-lt"/>
+              <a:ea typeface="+mn-ea"/>
+              <a:cs typeface="+mn-cs"/>
+            </a:endParaRPr>
           </a:p>
         </p:txBody>
       </p:sp>
@@ -6629,7 +6651,7 @@
         </p:nvSpPr>
         <p:spPr>
           <a:xfrm>
-            <a:off x="610739" y="770747"/>
+            <a:off x="636496" y="630600"/>
             <a:ext cx="4370527" cy="899665"/>
           </a:xfrm>
         </p:spPr>
@@ -9253,7 +9275,7 @@
         </p:blipFill>
         <p:spPr>
           <a:xfrm>
-            <a:off x="7001734" y="971688"/>
+            <a:off x="7001734" y="1048318"/>
             <a:ext cx="3705225" cy="666750"/>
           </a:xfrm>
           <a:prstGeom prst="rect">
@@ -9277,7 +9299,7 @@
         </p:nvSpPr>
         <p:spPr>
           <a:xfrm>
-            <a:off x="6850634" y="1670412"/>
+            <a:off x="6850634" y="1733543"/>
             <a:ext cx="3856325" cy="1904824"/>
           </a:xfrm>
           <a:prstGeom prst="rect">
@@ -10554,24 +10576,6 @@
 </file>
 
 <file path=customXml/item1.xml><?xml version="1.0" encoding="utf-8"?>
-<?mso-contentType ?>
-<FormTemplates xmlns="http://schemas.microsoft.com/sharepoint/v3/contenttype/forms">
-  <Display>DocumentLibraryForm</Display>
-  <Edit>DocumentLibraryForm</Edit>
-  <New>DocumentLibraryForm</New>
-</FormTemplates>
-</file>
-
-<file path=customXml/item2.xml><?xml version="1.0" encoding="utf-8"?>
-<p:properties xmlns:p="http://schemas.microsoft.com/office/2006/metadata/properties" xmlns:xsi="http://www.w3.org/2001/XMLSchema-instance" xmlns:pc="http://schemas.microsoft.com/office/infopath/2007/PartnerControls">
-  <documentManagement>
-    <_ip_UnifiedCompliancePolicyUIAction xmlns="http://schemas.microsoft.com/sharepoint/v3" xsi:nil="true"/>
-    <_ip_UnifiedCompliancePolicyProperties xmlns="http://schemas.microsoft.com/sharepoint/v3" xsi:nil="true"/>
-  </documentManagement>
-</p:properties>
-</file>
-
-<file path=customXml/item3.xml><?xml version="1.0" encoding="utf-8"?>
 <ct:contentTypeSchema xmlns:ct="http://schemas.microsoft.com/office/2006/metadata/contentType" xmlns:ma="http://schemas.microsoft.com/office/2006/metadata/properties/metaAttributes" ct:_="" ma:_="" ma:contentTypeName="Document" ma:contentTypeID="0x0101002C38000A9703F64DB1B0B0F9690848F1" ma:contentTypeVersion="8" ma:contentTypeDescription="Create a new document." ma:contentTypeScope="" ma:versionID="c8e9c521e6f660c1b04fabcece145e33">
   <xsd:schema xmlns:xsd="http://www.w3.org/2001/XMLSchema" xmlns:xs="http://www.w3.org/2001/XMLSchema" xmlns:p="http://schemas.microsoft.com/office/2006/metadata/properties" xmlns:ns1="http://schemas.microsoft.com/sharepoint/v3" xmlns:ns2="2b2dfeed-2da1-4ef4-b600-f5543001ef98" xmlns:ns3="d7b89efc-599c-41ef-afcb-e0aecc35db08" xmlns:ns4="bce24bd6-e6cb-4a8c-96ce-018168367603" targetNamespace="http://schemas.microsoft.com/office/2006/metadata/properties" ma:root="true" ma:fieldsID="d06bcca0b5371a54b6e0a0eed3aa93e0" ns1:_="" ns2:_="" ns3:_="" ns4:_="">
     <xsd:import namespace="http://schemas.microsoft.com/sharepoint/v3"/>
@@ -10772,10 +10776,41 @@
 </ct:contentTypeSchema>
 </file>
 
+<file path=customXml/item2.xml><?xml version="1.0" encoding="utf-8"?>
+<p:properties xmlns:p="http://schemas.microsoft.com/office/2006/metadata/properties" xmlns:xsi="http://www.w3.org/2001/XMLSchema-instance" xmlns:pc="http://schemas.microsoft.com/office/infopath/2007/PartnerControls">
+  <documentManagement>
+    <_ip_UnifiedCompliancePolicyUIAction xmlns="http://schemas.microsoft.com/sharepoint/v3" xsi:nil="true"/>
+    <_ip_UnifiedCompliancePolicyProperties xmlns="http://schemas.microsoft.com/sharepoint/v3" xsi:nil="true"/>
+  </documentManagement>
+</p:properties>
+</file>
+
+<file path=customXml/item3.xml><?xml version="1.0" encoding="utf-8"?>
+<?mso-contentType ?>
+<FormTemplates xmlns="http://schemas.microsoft.com/sharepoint/v3/contenttype/forms">
+  <Display>DocumentLibraryForm</Display>
+  <Edit>DocumentLibraryForm</Edit>
+  <New>DocumentLibraryForm</New>
+</FormTemplates>
+</file>
+
 <file path=customXml/itemProps1.xml><?xml version="1.0" encoding="utf-8"?>
-<ds:datastoreItem xmlns:ds="http://schemas.openxmlformats.org/officeDocument/2006/customXml" ds:itemID="{371264A9-8058-4AF9-AA9B-80619278D4D9}">
+<ds:datastoreItem xmlns:ds="http://schemas.openxmlformats.org/officeDocument/2006/customXml" ds:itemID="{EAF37662-712B-4B50-AE29-29DF85038855}">
   <ds:schemaRefs>
-    <ds:schemaRef ds:uri="http://schemas.microsoft.com/sharepoint/v3/contenttype/forms"/>
+    <ds:schemaRef ds:uri="http://schemas.microsoft.com/office/2006/metadata/contentType"/>
+    <ds:schemaRef ds:uri="http://schemas.microsoft.com/office/2006/metadata/properties/metaAttributes"/>
+    <ds:schemaRef ds:uri="http://www.w3.org/2001/XMLSchema"/>
+    <ds:schemaRef ds:uri="http://schemas.microsoft.com/office/2006/metadata/properties"/>
+    <ds:schemaRef ds:uri="http://schemas.microsoft.com/sharepoint/v3"/>
+    <ds:schemaRef ds:uri="2b2dfeed-2da1-4ef4-b600-f5543001ef98"/>
+    <ds:schemaRef ds:uri="d7b89efc-599c-41ef-afcb-e0aecc35db08"/>
+    <ds:schemaRef ds:uri="bce24bd6-e6cb-4a8c-96ce-018168367603"/>
+    <ds:schemaRef ds:uri="http://schemas.microsoft.com/office/2006/documentManagement/types"/>
+    <ds:schemaRef ds:uri="http://schemas.microsoft.com/office/infopath/2007/PartnerControls"/>
+    <ds:schemaRef ds:uri="http://schemas.openxmlformats.org/package/2006/metadata/core-properties"/>
+    <ds:schemaRef ds:uri="http://purl.org/dc/elements/1.1/"/>
+    <ds:schemaRef ds:uri="http://purl.org/dc/terms/"/>
+    <ds:schemaRef ds:uri="http://schemas.microsoft.com/internal/obd"/>
   </ds:schemaRefs>
 </ds:datastoreItem>
 </file>
@@ -10800,22 +10835,9 @@
 </file>
 
 <file path=customXml/itemProps3.xml><?xml version="1.0" encoding="utf-8"?>
-<ds:datastoreItem xmlns:ds="http://schemas.openxmlformats.org/officeDocument/2006/customXml" ds:itemID="{EAF37662-712B-4B50-AE29-29DF85038855}">
+<ds:datastoreItem xmlns:ds="http://schemas.openxmlformats.org/officeDocument/2006/customXml" ds:itemID="{371264A9-8058-4AF9-AA9B-80619278D4D9}">
   <ds:schemaRefs>
-    <ds:schemaRef ds:uri="http://schemas.microsoft.com/office/2006/metadata/contentType"/>
-    <ds:schemaRef ds:uri="http://schemas.microsoft.com/office/2006/metadata/properties/metaAttributes"/>
-    <ds:schemaRef ds:uri="http://www.w3.org/2001/XMLSchema"/>
-    <ds:schemaRef ds:uri="http://schemas.microsoft.com/office/2006/metadata/properties"/>
-    <ds:schemaRef ds:uri="http://schemas.microsoft.com/sharepoint/v3"/>
-    <ds:schemaRef ds:uri="2b2dfeed-2da1-4ef4-b600-f5543001ef98"/>
-    <ds:schemaRef ds:uri="d7b89efc-599c-41ef-afcb-e0aecc35db08"/>
-    <ds:schemaRef ds:uri="bce24bd6-e6cb-4a8c-96ce-018168367603"/>
-    <ds:schemaRef ds:uri="http://schemas.microsoft.com/office/2006/documentManagement/types"/>
-    <ds:schemaRef ds:uri="http://schemas.microsoft.com/office/infopath/2007/PartnerControls"/>
-    <ds:schemaRef ds:uri="http://schemas.openxmlformats.org/package/2006/metadata/core-properties"/>
-    <ds:schemaRef ds:uri="http://purl.org/dc/elements/1.1/"/>
-    <ds:schemaRef ds:uri="http://purl.org/dc/terms/"/>
-    <ds:schemaRef ds:uri="http://schemas.microsoft.com/internal/obd"/>
+    <ds:schemaRef ds:uri="http://schemas.microsoft.com/sharepoint/v3/contenttype/forms"/>
   </ds:schemaRefs>
 </ds:datastoreItem>
 </file>
</xml_diff>